<commit_message>
Efecto del empleo de la matriz de permutacion para intercambio de columnas
</commit_message>
<xml_diff>
--- a/lectures_strang_en/Lecture_02_Strang_EN.pptx
+++ b/lectures_strang_en/Lecture_02_Strang_EN.pptx
@@ -237,7 +237,7 @@
           <a:p>
             <a:fld id="{C7B76BB3-96B4-D949-BA97-2F034CC20E35}" type="datetimeFigureOut">
               <a:rPr lang="es-ES_tradnl" smtClean="0"/>
-              <a:t>12/3/21</a:t>
+              <a:t>19/03/2024</a:t>
             </a:fld>
             <a:endParaRPr lang="es-ES_tradnl"/>
           </a:p>
@@ -410,7 +410,7 @@
           <a:p>
             <a:fld id="{BC3897DA-3038-2943-8BC6-34E6C6DE6379}" type="datetimeFigureOut">
               <a:rPr lang="es-ES_tradnl" smtClean="0"/>
-              <a:t>12/3/21</a:t>
+              <a:t>19/03/2024</a:t>
             </a:fld>
             <a:endParaRPr lang="es-ES_tradnl"/>
           </a:p>
@@ -872,7 +872,7 @@
             <a:fld id="{75EEBB46-7A81-4557-A313-00D814F92FCC}" type="datetimeFigureOut">
               <a:rPr lang="es-ES" smtClean="0"/>
               <a:pPr/>
-              <a:t>12/3/21</a:t>
+              <a:t>19/03/2024</a:t>
             </a:fld>
             <a:endParaRPr lang="es-ES"/>
           </a:p>
@@ -1235,7 +1235,7 @@
             <a:fld id="{75EEBB46-7A81-4557-A313-00D814F92FCC}" type="datetimeFigureOut">
               <a:rPr lang="es-ES" smtClean="0"/>
               <a:pPr/>
-              <a:t>12/3/21</a:t>
+              <a:t>19/03/2024</a:t>
             </a:fld>
             <a:endParaRPr lang="es-ES"/>
           </a:p>
@@ -1420,7 +1420,7 @@
             <a:fld id="{75EEBB46-7A81-4557-A313-00D814F92FCC}" type="datetimeFigureOut">
               <a:rPr lang="es-ES" smtClean="0"/>
               <a:pPr/>
-              <a:t>12/3/21</a:t>
+              <a:t>19/03/2024</a:t>
             </a:fld>
             <a:endParaRPr lang="es-ES"/>
           </a:p>
@@ -1543,7 +1543,7 @@
             <a:fld id="{75EEBB46-7A81-4557-A313-00D814F92FCC}" type="datetimeFigureOut">
               <a:rPr lang="es-ES" smtClean="0"/>
               <a:pPr/>
-              <a:t>12/3/21</a:t>
+              <a:t>19/03/2024</a:t>
             </a:fld>
             <a:endParaRPr lang="es-ES"/>
           </a:p>
@@ -1911,7 +1911,7 @@
             <a:fld id="{75EEBB46-7A81-4557-A313-00D814F92FCC}" type="datetimeFigureOut">
               <a:rPr lang="es-ES" smtClean="0"/>
               <a:pPr/>
-              <a:t>12/3/21</a:t>
+              <a:t>19/03/2024</a:t>
             </a:fld>
             <a:endParaRPr lang="es-ES"/>
           </a:p>
@@ -2186,7 +2186,7 @@
             <a:fld id="{75EEBB46-7A81-4557-A313-00D814F92FCC}" type="datetimeFigureOut">
               <a:rPr lang="es-ES" smtClean="0"/>
               <a:pPr/>
-              <a:t>12/3/21</a:t>
+              <a:t>19/03/2024</a:t>
             </a:fld>
             <a:endParaRPr lang="es-ES"/>
           </a:p>
@@ -2558,7 +2558,7 @@
             <a:fld id="{75EEBB46-7A81-4557-A313-00D814F92FCC}" type="datetimeFigureOut">
               <a:rPr lang="es-ES" smtClean="0"/>
               <a:pPr/>
-              <a:t>12/3/21</a:t>
+              <a:t>19/03/2024</a:t>
             </a:fld>
             <a:endParaRPr lang="es-ES"/>
           </a:p>
@@ -2795,7 +2795,7 @@
             <a:fld id="{75EEBB46-7A81-4557-A313-00D814F92FCC}" type="datetimeFigureOut">
               <a:rPr lang="es-ES" smtClean="0"/>
               <a:pPr/>
-              <a:t>12/3/21</a:t>
+              <a:t>19/03/2024</a:t>
             </a:fld>
             <a:endParaRPr lang="es-ES"/>
           </a:p>
@@ -2895,7 +2895,7 @@
             <a:fld id="{75EEBB46-7A81-4557-A313-00D814F92FCC}" type="datetimeFigureOut">
               <a:rPr lang="es-ES" smtClean="0"/>
               <a:pPr/>
-              <a:t>12/3/21</a:t>
+              <a:t>19/03/2024</a:t>
             </a:fld>
             <a:endParaRPr lang="es-ES"/>
           </a:p>
@@ -3172,7 +3172,7 @@
             <a:fld id="{75EEBB46-7A81-4557-A313-00D814F92FCC}" type="datetimeFigureOut">
               <a:rPr lang="es-ES" smtClean="0"/>
               <a:pPr/>
-              <a:t>12/3/21</a:t>
+              <a:t>19/03/2024</a:t>
             </a:fld>
             <a:endParaRPr lang="es-ES"/>
           </a:p>
@@ -3410,7 +3410,7 @@
             <a:fld id="{75EEBB46-7A81-4557-A313-00D814F92FCC}" type="datetimeFigureOut">
               <a:rPr lang="es-ES" smtClean="0"/>
               <a:pPr/>
-              <a:t>12/3/21</a:t>
+              <a:t>19/03/2024</a:t>
             </a:fld>
             <a:endParaRPr lang="es-ES"/>
           </a:p>
@@ -3911,7 +3911,7 @@
             <a:fld id="{75EEBB46-7A81-4557-A313-00D814F92FCC}" type="datetimeFigureOut">
               <a:rPr lang="es-ES" smtClean="0"/>
               <a:pPr/>
-              <a:t>12/3/21</a:t>
+              <a:t>19/03/2024</a:t>
             </a:fld>
             <a:endParaRPr lang="es-ES"/>
           </a:p>
@@ -14675,8 +14675,8 @@
           </a:p>
         </p:txBody>
       </p:sp>
-      <mc:AlternateContent xmlns:mc="http://schemas.openxmlformats.org/markup-compatibility/2006">
-        <mc:Choice xmlns:a14="http://schemas.microsoft.com/office/drawing/2010/main" Requires="a14">
+      <mc:AlternateContent xmlns:mc="http://schemas.openxmlformats.org/markup-compatibility/2006" xmlns:a14="http://schemas.microsoft.com/office/drawing/2010/main">
+        <mc:Choice Requires="a14">
           <p:sp>
             <p:nvSpPr>
               <p:cNvPr id="14" name="CuadroTexto 13">
@@ -15000,16 +15000,7 @@
                         </a:solidFill>
                         <a:latin typeface="Cambria Math" panose="02040503050406030204" pitchFamily="18" charset="0"/>
                       </a:rPr>
-                      <m:t>0</m:t>
-                    </m:r>
-                    <m:r>
-                      <a:rPr lang="es-ES" sz="2400" b="0" i="1" smtClean="0">
-                        <a:solidFill>
-                          <a:srgbClr val="FF0000"/>
-                        </a:solidFill>
-                        <a:latin typeface="Cambria Math" panose="02040503050406030204" pitchFamily="18" charset="0"/>
-                      </a:rPr>
-                      <m:t>4</m:t>
+                      <m:t>04</m:t>
                     </m:r>
                     <m:r>
                       <a:rPr lang="es-ES" sz="2400" i="1">
@@ -15252,7 +15243,7 @@
             </p:txBody>
           </p:sp>
         </mc:Choice>
-        <mc:Fallback>
+        <mc:Fallback xmlns="">
           <p:sp>
             <p:nvSpPr>
               <p:cNvPr id="14" name="CuadroTexto 13">
@@ -22197,8 +22188,8 @@
           </p:sp>
         </mc:Fallback>
       </mc:AlternateContent>
-      <mc:AlternateContent xmlns:mc="http://schemas.openxmlformats.org/markup-compatibility/2006">
-        <mc:Choice xmlns:a14="http://schemas.microsoft.com/office/drawing/2010/main" Requires="a14">
+      <mc:AlternateContent xmlns:mc="http://schemas.openxmlformats.org/markup-compatibility/2006" xmlns:a14="http://schemas.microsoft.com/office/drawing/2010/main">
+        <mc:Choice Requires="a14">
           <p:sp>
             <p:nvSpPr>
               <p:cNvPr id="9" name="Rectángulo 8">
@@ -22368,7 +22359,7 @@
             </p:txBody>
           </p:sp>
         </mc:Choice>
-        <mc:Fallback>
+        <mc:Fallback xmlns="">
           <p:sp>
             <p:nvSpPr>
               <p:cNvPr id="9" name="Rectángulo 8">
@@ -23166,8 +23157,8 @@
           </a:p>
         </p:txBody>
       </p:sp>
-      <mc:AlternateContent xmlns:mc="http://schemas.openxmlformats.org/markup-compatibility/2006" xmlns:a14="http://schemas.microsoft.com/office/drawing/2010/main">
-        <mc:Choice Requires="a14">
+      <mc:AlternateContent xmlns:mc="http://schemas.openxmlformats.org/markup-compatibility/2006">
+        <mc:Choice xmlns:a14="http://schemas.microsoft.com/office/drawing/2010/main" Requires="a14">
           <p:sp>
             <p:nvSpPr>
               <p:cNvPr id="14" name="Rectángulo 13">
@@ -23340,10 +23331,10 @@
                             </m:e>
                             <m:e>
                               <m:r>
-                                <a:rPr lang="es-ES" b="0" i="1" smtClean="0">
-                                  <a:latin typeface="Cambria Math" panose="02040503050406030204" pitchFamily="18" charset="0"/>
-                                </a:rPr>
-                                <m:t>𝑐</m:t>
+                                <a:rPr lang="es-419" b="0" i="1" smtClean="0">
+                                  <a:latin typeface="Cambria Math" panose="02040503050406030204" pitchFamily="18" charset="0"/>
+                                </a:rPr>
+                                <m:t>𝑑</m:t>
                               </m:r>
                             </m:e>
                           </m:mr>
@@ -23434,7 +23425,7 @@
             </p:txBody>
           </p:sp>
         </mc:Choice>
-        <mc:Fallback xmlns="">
+        <mc:Fallback>
           <p:sp>
             <p:nvSpPr>
               <p:cNvPr id="14" name="Rectángulo 13">
@@ -23460,7 +23451,7 @@
               <a:blipFill>
                 <a:blip r:embed="rId4"/>
                 <a:stretch>
-                  <a:fillRect b="-2128"/>
+                  <a:fillRect b="-1064"/>
                 </a:stretch>
               </a:blipFill>
             </p:spPr>
@@ -23469,7 +23460,7 @@
               <a:lstStyle/>
               <a:p>
                 <a:r>
-                  <a:rPr lang="es-PY">
+                  <a:rPr lang="es-419">
                     <a:noFill/>
                   </a:rPr>
                   <a:t> </a:t>
@@ -23973,8 +23964,8 @@
           </p:sp>
         </mc:Fallback>
       </mc:AlternateContent>
-      <mc:AlternateContent xmlns:mc="http://schemas.openxmlformats.org/markup-compatibility/2006" xmlns:a14="http://schemas.microsoft.com/office/drawing/2010/main">
-        <mc:Choice Requires="a14">
+      <mc:AlternateContent xmlns:mc="http://schemas.openxmlformats.org/markup-compatibility/2006">
+        <mc:Choice xmlns:a14="http://schemas.microsoft.com/office/drawing/2010/main" Requires="a14">
           <p:sp>
             <p:nvSpPr>
               <p:cNvPr id="18" name="Rectángulo 17">
@@ -24233,18 +24224,18 @@
                           <m:mr>
                             <m:e>
                               <m:r>
-                                <a:rPr lang="es-ES" b="0" i="1" smtClean="0">
-                                  <a:latin typeface="Cambria Math" panose="02040503050406030204" pitchFamily="18" charset="0"/>
-                                </a:rPr>
-                                <m:t>𝑐</m:t>
+                                <a:rPr lang="es-419" b="0" i="1" smtClean="0">
+                                  <a:latin typeface="Cambria Math" panose="02040503050406030204" pitchFamily="18" charset="0"/>
+                                </a:rPr>
+                                <m:t>𝑑</m:t>
                               </m:r>
                             </m:e>
                             <m:e>
                               <m:r>
-                                <a:rPr lang="es-ES" b="0" i="1" smtClean="0">
-                                  <a:latin typeface="Cambria Math" panose="02040503050406030204" pitchFamily="18" charset="0"/>
-                                </a:rPr>
-                                <m:t>𝑑</m:t>
+                                <a:rPr lang="es-419" b="0" i="1" smtClean="0">
+                                  <a:latin typeface="Cambria Math" panose="02040503050406030204" pitchFamily="18" charset="0"/>
+                                </a:rPr>
+                                <m:t>𝑐</m:t>
                               </m:r>
                             </m:e>
                           </m:mr>
@@ -24258,7 +24249,7 @@
             </p:txBody>
           </p:sp>
         </mc:Choice>
-        <mc:Fallback xmlns="">
+        <mc:Fallback>
           <p:sp>
             <p:nvSpPr>
               <p:cNvPr id="18" name="Rectángulo 17">
@@ -24284,7 +24275,7 @@
               <a:blipFill>
                 <a:blip r:embed="rId7"/>
                 <a:stretch>
-                  <a:fillRect b="-4255"/>
+                  <a:fillRect/>
                 </a:stretch>
               </a:blipFill>
             </p:spPr>
@@ -24293,7 +24284,7 @@
               <a:lstStyle/>
               <a:p>
                 <a:r>
-                  <a:rPr lang="es-PY">
+                  <a:rPr lang="es-419">
                     <a:noFill/>
                   </a:rPr>
                   <a:t> </a:t>
@@ -24303,8 +24294,8 @@
           </p:sp>
         </mc:Fallback>
       </mc:AlternateContent>
-      <mc:AlternateContent xmlns:mc="http://schemas.openxmlformats.org/markup-compatibility/2006" xmlns:a14="http://schemas.microsoft.com/office/drawing/2010/main">
-        <mc:Choice Requires="a14">
+      <mc:AlternateContent xmlns:mc="http://schemas.openxmlformats.org/markup-compatibility/2006">
+        <mc:Choice xmlns:a14="http://schemas.microsoft.com/office/drawing/2010/main" Requires="a14">
           <p:sp>
             <p:nvSpPr>
               <p:cNvPr id="19" name="Rectángulo 18">
@@ -24393,10 +24384,10 @@
                             </m:e>
                             <m:e>
                               <m:r>
-                                <a:rPr lang="es-ES" b="0" i="1" smtClean="0">
-                                  <a:latin typeface="Cambria Math" panose="02040503050406030204" pitchFamily="18" charset="0"/>
-                                </a:rPr>
-                                <m:t>𝑐</m:t>
+                                <a:rPr lang="es-419" b="0" i="1" smtClean="0">
+                                  <a:latin typeface="Cambria Math" panose="02040503050406030204" pitchFamily="18" charset="0"/>
+                                </a:rPr>
+                                <m:t>𝑑</m:t>
                               </m:r>
                             </m:e>
                           </m:mr>
@@ -24588,7 +24579,7 @@
             </p:txBody>
           </p:sp>
         </mc:Choice>
-        <mc:Fallback xmlns="">
+        <mc:Fallback>
           <p:sp>
             <p:nvSpPr>
               <p:cNvPr id="19" name="Rectángulo 18">
@@ -24614,7 +24605,7 @@
               <a:blipFill>
                 <a:blip r:embed="rId8"/>
                 <a:stretch>
-                  <a:fillRect b="-4348"/>
+                  <a:fillRect b="-1064"/>
                 </a:stretch>
               </a:blipFill>
             </p:spPr>
@@ -24623,7 +24614,7 @@
               <a:lstStyle/>
               <a:p>
                 <a:r>
-                  <a:rPr lang="es-PY">
+                  <a:rPr lang="es-419">
                     <a:noFill/>
                   </a:rPr>
                   <a:t> </a:t>
@@ -24633,8 +24624,8 @@
           </p:sp>
         </mc:Fallback>
       </mc:AlternateContent>
-      <mc:AlternateContent xmlns:mc="http://schemas.openxmlformats.org/markup-compatibility/2006" xmlns:a14="http://schemas.microsoft.com/office/drawing/2010/main">
-        <mc:Choice Requires="a14">
+      <mc:AlternateContent xmlns:mc="http://schemas.openxmlformats.org/markup-compatibility/2006">
+        <mc:Choice xmlns:a14="http://schemas.microsoft.com/office/drawing/2010/main" Requires="a14">
           <p:sp>
             <p:nvSpPr>
               <p:cNvPr id="6" name="Rectángulo 5">
@@ -24650,7 +24641,7 @@
             <p:spPr>
               <a:xfrm>
                 <a:off x="977111" y="4725144"/>
-                <a:ext cx="2267993" cy="559833"/>
+                <a:ext cx="2349489" cy="559833"/>
               </a:xfrm>
               <a:prstGeom prst="rect">
                 <a:avLst/>
@@ -24725,7 +24716,7 @@
                                 </m:mc>
                               </m:mcs>
                               <m:ctrlPr>
-                                <a:rPr lang="es-PY" i="1">
+                                <a:rPr lang="es-PY" i="1" smtClean="0">
                                   <a:latin typeface="Cambria Math" panose="02040503050406030204" pitchFamily="18" charset="0"/>
                                 </a:rPr>
                               </m:ctrlPr>
@@ -24762,10 +24753,10 @@
                               </m:e>
                               <m:e>
                                 <m:r>
-                                  <a:rPr lang="es-ES" i="1">
+                                  <a:rPr lang="es-419" b="0" i="1" smtClean="0">
                                     <a:latin typeface="Cambria Math" panose="02040503050406030204" pitchFamily="18" charset="0"/>
                                   </a:rPr>
-                                  <m:t>𝑐</m:t>
+                                  <m:t>𝑑</m:t>
                                 </m:r>
                               </m:e>
                             </m:mr>
@@ -24856,7 +24847,7 @@
             </p:txBody>
           </p:sp>
         </mc:Choice>
-        <mc:Fallback xmlns="">
+        <mc:Fallback>
           <p:sp>
             <p:nvSpPr>
               <p:cNvPr id="6" name="Rectángulo 5">
@@ -24874,7 +24865,7 @@
             <p:spPr>
               <a:xfrm>
                 <a:off x="977111" y="4725144"/>
-                <a:ext cx="2267993" cy="559833"/>
+                <a:ext cx="2349489" cy="559833"/>
               </a:xfrm>
               <a:prstGeom prst="rect">
                 <a:avLst/>
@@ -24882,7 +24873,7 @@
               <a:blipFill>
                 <a:blip r:embed="rId9"/>
                 <a:stretch>
-                  <a:fillRect b="-9091"/>
+                  <a:fillRect/>
                 </a:stretch>
               </a:blipFill>
             </p:spPr>
@@ -24891,7 +24882,7 @@
               <a:lstStyle/>
               <a:p>
                 <a:r>
-                  <a:rPr lang="es-PY">
+                  <a:rPr lang="es-419">
                     <a:noFill/>
                   </a:rPr>
                   <a:t> </a:t>
@@ -24901,8 +24892,8 @@
           </p:sp>
         </mc:Fallback>
       </mc:AlternateContent>
-      <mc:AlternateContent xmlns:mc="http://schemas.openxmlformats.org/markup-compatibility/2006" xmlns:a14="http://schemas.microsoft.com/office/drawing/2010/main">
-        <mc:Choice Requires="a14">
+      <mc:AlternateContent xmlns:mc="http://schemas.openxmlformats.org/markup-compatibility/2006">
+        <mc:Choice xmlns:a14="http://schemas.microsoft.com/office/drawing/2010/main" Requires="a14">
           <p:sp>
             <p:nvSpPr>
               <p:cNvPr id="21" name="Rectángulo 20">
@@ -24996,10 +24987,10 @@
                               </m:e>
                               <m:e>
                                 <m:r>
-                                  <a:rPr lang="es-ES" i="1">
+                                  <a:rPr lang="es-419" b="0" i="1" smtClean="0">
                                     <a:latin typeface="Cambria Math" panose="02040503050406030204" pitchFamily="18" charset="0"/>
                                   </a:rPr>
-                                  <m:t>𝑐</m:t>
+                                  <m:t>𝑑</m:t>
                                 </m:r>
                               </m:e>
                             </m:mr>
@@ -25124,7 +25115,7 @@
             </p:txBody>
           </p:sp>
         </mc:Choice>
-        <mc:Fallback xmlns="">
+        <mc:Fallback>
           <p:sp>
             <p:nvSpPr>
               <p:cNvPr id="21" name="Rectángulo 20">
@@ -25150,7 +25141,7 @@
               <a:blipFill>
                 <a:blip r:embed="rId10"/>
                 <a:stretch>
-                  <a:fillRect b="-9091"/>
+                  <a:fillRect/>
                 </a:stretch>
               </a:blipFill>
             </p:spPr>
@@ -25159,7 +25150,7 @@
               <a:lstStyle/>
               <a:p>
                 <a:r>
-                  <a:rPr lang="es-PY">
+                  <a:rPr lang="es-419">
                     <a:noFill/>
                   </a:rPr>
                   <a:t> </a:t>

</xml_diff>

<commit_message>
Efecto del empleo de la matriz de permutación para el intercambio de columnas
</commit_message>
<xml_diff>
--- a/lectures_strang_en/Lecture_02_Strang_EN.pptx
+++ b/lectures_strang_en/Lecture_02_Strang_EN.pptx
@@ -237,7 +237,7 @@
           <a:p>
             <a:fld id="{C7B76BB3-96B4-D949-BA97-2F034CC20E35}" type="datetimeFigureOut">
               <a:rPr lang="es-ES_tradnl" smtClean="0"/>
-              <a:t>19/03/2024</a:t>
+              <a:t>20/03/2024</a:t>
             </a:fld>
             <a:endParaRPr lang="es-ES_tradnl"/>
           </a:p>
@@ -311,7 +311,7 @@
           <a:p>
             <a:fld id="{EABEA0F2-AFBD-024B-A401-8C555BB443D7}" type="slidenum">
               <a:rPr lang="es-ES_tradnl" smtClean="0"/>
-              <a:t>‹Nº›</a:t>
+              <a:t>‹#›</a:t>
             </a:fld>
             <a:endParaRPr lang="es-ES_tradnl"/>
           </a:p>
@@ -410,7 +410,7 @@
           <a:p>
             <a:fld id="{BC3897DA-3038-2943-8BC6-34E6C6DE6379}" type="datetimeFigureOut">
               <a:rPr lang="es-ES_tradnl" smtClean="0"/>
-              <a:t>19/03/2024</a:t>
+              <a:t>20/03/2024</a:t>
             </a:fld>
             <a:endParaRPr lang="es-ES_tradnl"/>
           </a:p>
@@ -568,7 +568,7 @@
           <a:p>
             <a:fld id="{F353074F-A04A-334B-ACA3-A5B1880CCD8C}" type="slidenum">
               <a:rPr lang="es-ES_tradnl" smtClean="0"/>
-              <a:t>‹Nº›</a:t>
+              <a:t>‹#›</a:t>
             </a:fld>
             <a:endParaRPr lang="es-ES_tradnl"/>
           </a:p>
@@ -872,7 +872,7 @@
             <a:fld id="{75EEBB46-7A81-4557-A313-00D814F92FCC}" type="datetimeFigureOut">
               <a:rPr lang="es-ES" smtClean="0"/>
               <a:pPr/>
-              <a:t>19/03/2024</a:t>
+              <a:t>20/03/2024</a:t>
             </a:fld>
             <a:endParaRPr lang="es-ES"/>
           </a:p>
@@ -933,7 +933,7 @@
             <a:fld id="{97287F69-1120-4A6A-B09C-9437B6B63836}" type="slidenum">
               <a:rPr lang="es-ES" smtClean="0"/>
               <a:pPr/>
-              <a:t>‹Nº›</a:t>
+              <a:t>‹#›</a:t>
             </a:fld>
             <a:endParaRPr lang="es-ES"/>
           </a:p>
@@ -1235,7 +1235,7 @@
             <a:fld id="{75EEBB46-7A81-4557-A313-00D814F92FCC}" type="datetimeFigureOut">
               <a:rPr lang="es-ES" smtClean="0"/>
               <a:pPr/>
-              <a:t>19/03/2024</a:t>
+              <a:t>20/03/2024</a:t>
             </a:fld>
             <a:endParaRPr lang="es-ES"/>
           </a:p>
@@ -1286,7 +1286,7 @@
             <a:fld id="{97287F69-1120-4A6A-B09C-9437B6B63836}" type="slidenum">
               <a:rPr lang="es-ES" smtClean="0"/>
               <a:pPr/>
-              <a:t>‹Nº›</a:t>
+              <a:t>‹#›</a:t>
             </a:fld>
             <a:endParaRPr lang="es-ES"/>
           </a:p>
@@ -1420,7 +1420,7 @@
             <a:fld id="{75EEBB46-7A81-4557-A313-00D814F92FCC}" type="datetimeFigureOut">
               <a:rPr lang="es-ES" smtClean="0"/>
               <a:pPr/>
-              <a:t>19/03/2024</a:t>
+              <a:t>20/03/2024</a:t>
             </a:fld>
             <a:endParaRPr lang="es-ES"/>
           </a:p>
@@ -1471,7 +1471,7 @@
             <a:fld id="{97287F69-1120-4A6A-B09C-9437B6B63836}" type="slidenum">
               <a:rPr lang="es-ES" smtClean="0"/>
               <a:pPr/>
-              <a:t>‹Nº›</a:t>
+              <a:t>‹#›</a:t>
             </a:fld>
             <a:endParaRPr lang="es-ES"/>
           </a:p>
@@ -1543,7 +1543,7 @@
             <a:fld id="{75EEBB46-7A81-4557-A313-00D814F92FCC}" type="datetimeFigureOut">
               <a:rPr lang="es-ES" smtClean="0"/>
               <a:pPr/>
-              <a:t>19/03/2024</a:t>
+              <a:t>20/03/2024</a:t>
             </a:fld>
             <a:endParaRPr lang="es-ES"/>
           </a:p>
@@ -1594,7 +1594,7 @@
             <a:fld id="{97287F69-1120-4A6A-B09C-9437B6B63836}" type="slidenum">
               <a:rPr lang="es-ES" smtClean="0"/>
               <a:pPr/>
-              <a:t>‹Nº›</a:t>
+              <a:t>‹#›</a:t>
             </a:fld>
             <a:endParaRPr lang="es-ES"/>
           </a:p>
@@ -1911,7 +1911,7 @@
             <a:fld id="{75EEBB46-7A81-4557-A313-00D814F92FCC}" type="datetimeFigureOut">
               <a:rPr lang="es-ES" smtClean="0"/>
               <a:pPr/>
-              <a:t>19/03/2024</a:t>
+              <a:t>20/03/2024</a:t>
             </a:fld>
             <a:endParaRPr lang="es-ES"/>
           </a:p>
@@ -2114,7 +2114,7 @@
             <a:fld id="{97287F69-1120-4A6A-B09C-9437B6B63836}" type="slidenum">
               <a:rPr lang="es-ES" smtClean="0"/>
               <a:pPr/>
-              <a:t>‹Nº›</a:t>
+              <a:t>‹#›</a:t>
             </a:fld>
             <a:endParaRPr lang="es-ES"/>
           </a:p>
@@ -2186,7 +2186,7 @@
             <a:fld id="{75EEBB46-7A81-4557-A313-00D814F92FCC}" type="datetimeFigureOut">
               <a:rPr lang="es-ES" smtClean="0"/>
               <a:pPr/>
-              <a:t>19/03/2024</a:t>
+              <a:t>20/03/2024</a:t>
             </a:fld>
             <a:endParaRPr lang="es-ES"/>
           </a:p>
@@ -2237,7 +2237,7 @@
             <a:fld id="{97287F69-1120-4A6A-B09C-9437B6B63836}" type="slidenum">
               <a:rPr lang="es-ES" smtClean="0"/>
               <a:pPr/>
-              <a:t>‹Nº›</a:t>
+              <a:t>‹#›</a:t>
             </a:fld>
             <a:endParaRPr lang="es-ES"/>
           </a:p>
@@ -2558,7 +2558,7 @@
             <a:fld id="{75EEBB46-7A81-4557-A313-00D814F92FCC}" type="datetimeFigureOut">
               <a:rPr lang="es-ES" smtClean="0"/>
               <a:pPr/>
-              <a:t>19/03/2024</a:t>
+              <a:t>20/03/2024</a:t>
             </a:fld>
             <a:endParaRPr lang="es-ES"/>
           </a:p>
@@ -2609,7 +2609,7 @@
             <a:fld id="{97287F69-1120-4A6A-B09C-9437B6B63836}" type="slidenum">
               <a:rPr lang="es-ES" smtClean="0"/>
               <a:pPr/>
-              <a:t>‹Nº›</a:t>
+              <a:t>‹#›</a:t>
             </a:fld>
             <a:endParaRPr lang="es-ES"/>
           </a:p>
@@ -2795,7 +2795,7 @@
             <a:fld id="{75EEBB46-7A81-4557-A313-00D814F92FCC}" type="datetimeFigureOut">
               <a:rPr lang="es-ES" smtClean="0"/>
               <a:pPr/>
-              <a:t>19/03/2024</a:t>
+              <a:t>20/03/2024</a:t>
             </a:fld>
             <a:endParaRPr lang="es-ES"/>
           </a:p>
@@ -2846,7 +2846,7 @@
             <a:fld id="{97287F69-1120-4A6A-B09C-9437B6B63836}" type="slidenum">
               <a:rPr lang="es-ES" smtClean="0"/>
               <a:pPr/>
-              <a:t>‹Nº›</a:t>
+              <a:t>‹#›</a:t>
             </a:fld>
             <a:endParaRPr lang="es-ES"/>
           </a:p>
@@ -2895,7 +2895,7 @@
             <a:fld id="{75EEBB46-7A81-4557-A313-00D814F92FCC}" type="datetimeFigureOut">
               <a:rPr lang="es-ES" smtClean="0"/>
               <a:pPr/>
-              <a:t>19/03/2024</a:t>
+              <a:t>20/03/2024</a:t>
             </a:fld>
             <a:endParaRPr lang="es-ES"/>
           </a:p>
@@ -2946,7 +2946,7 @@
             <a:fld id="{97287F69-1120-4A6A-B09C-9437B6B63836}" type="slidenum">
               <a:rPr lang="es-ES" smtClean="0"/>
               <a:pPr/>
-              <a:t>‹Nº›</a:t>
+              <a:t>‹#›</a:t>
             </a:fld>
             <a:endParaRPr lang="es-ES"/>
           </a:p>
@@ -3172,7 +3172,7 @@
             <a:fld id="{75EEBB46-7A81-4557-A313-00D814F92FCC}" type="datetimeFigureOut">
               <a:rPr lang="es-ES" smtClean="0"/>
               <a:pPr/>
-              <a:t>19/03/2024</a:t>
+              <a:t>20/03/2024</a:t>
             </a:fld>
             <a:endParaRPr lang="es-ES"/>
           </a:p>
@@ -3223,7 +3223,7 @@
             <a:fld id="{97287F69-1120-4A6A-B09C-9437B6B63836}" type="slidenum">
               <a:rPr lang="es-ES" smtClean="0"/>
               <a:pPr/>
-              <a:t>‹Nº›</a:t>
+              <a:t>‹#›</a:t>
             </a:fld>
             <a:endParaRPr lang="es-ES"/>
           </a:p>
@@ -3410,7 +3410,7 @@
             <a:fld id="{75EEBB46-7A81-4557-A313-00D814F92FCC}" type="datetimeFigureOut">
               <a:rPr lang="es-ES" smtClean="0"/>
               <a:pPr/>
-              <a:t>19/03/2024</a:t>
+              <a:t>20/03/2024</a:t>
             </a:fld>
             <a:endParaRPr lang="es-ES"/>
           </a:p>
@@ -3463,7 +3463,7 @@
             <a:fld id="{97287F69-1120-4A6A-B09C-9437B6B63836}" type="slidenum">
               <a:rPr lang="es-ES" smtClean="0"/>
               <a:pPr/>
-              <a:t>‹Nº›</a:t>
+              <a:t>‹#›</a:t>
             </a:fld>
             <a:endParaRPr lang="es-ES"/>
           </a:p>
@@ -3911,7 +3911,7 @@
             <a:fld id="{75EEBB46-7A81-4557-A313-00D814F92FCC}" type="datetimeFigureOut">
               <a:rPr lang="es-ES" smtClean="0"/>
               <a:pPr/>
-              <a:t>19/03/2024</a:t>
+              <a:t>20/03/2024</a:t>
             </a:fld>
             <a:endParaRPr lang="es-ES"/>
           </a:p>
@@ -4010,7 +4010,7 @@
             <a:fld id="{97287F69-1120-4A6A-B09C-9437B6B63836}" type="slidenum">
               <a:rPr lang="es-ES" smtClean="0"/>
               <a:pPr/>
-              <a:t>‹Nº›</a:t>
+              <a:t>‹#›</a:t>
             </a:fld>
             <a:endParaRPr lang="es-ES"/>
           </a:p>
@@ -22545,8 +22545,8 @@
           </a:p>
         </p:txBody>
       </p:sp>
-      <mc:AlternateContent xmlns:mc="http://schemas.openxmlformats.org/markup-compatibility/2006" xmlns:a14="http://schemas.microsoft.com/office/drawing/2010/main">
-        <mc:Choice Requires="a14">
+      <mc:AlternateContent xmlns:mc="http://schemas.openxmlformats.org/markup-compatibility/2006">
+        <mc:Choice xmlns:a14="http://schemas.microsoft.com/office/drawing/2010/main" Requires="a14">
           <p:sp>
             <p:nvSpPr>
               <p:cNvPr id="11" name="Rectángulo 10">
@@ -22562,7 +22562,7 @@
             <p:spPr>
               <a:xfrm>
                 <a:off x="755576" y="1836935"/>
-                <a:ext cx="2489528" cy="559833"/>
+                <a:ext cx="2505879" cy="585288"/>
               </a:xfrm>
               <a:prstGeom prst="rect">
                 <a:avLst/>
@@ -22719,10 +22719,10 @@
                             </m:e>
                             <m:e>
                               <m:r>
-                                <a:rPr lang="es-ES" b="0" i="1" smtClean="0">
-                                  <a:latin typeface="Cambria Math" panose="02040503050406030204" pitchFamily="18" charset="0"/>
-                                </a:rPr>
-                                <m:t>𝑐</m:t>
+                                <a:rPr lang="es-PY" b="0" i="1" smtClean="0">
+                                  <a:latin typeface="Cambria Math" panose="02040503050406030204" pitchFamily="18" charset="0"/>
+                                </a:rPr>
+                                <m:t>𝑑</m:t>
                               </m:r>
                             </m:e>
                           </m:mr>
@@ -22813,7 +22813,7 @@
             </p:txBody>
           </p:sp>
         </mc:Choice>
-        <mc:Fallback xmlns="">
+        <mc:Fallback>
           <p:sp>
             <p:nvSpPr>
               <p:cNvPr id="11" name="Rectángulo 10">
@@ -22831,7 +22831,7 @@
             <p:spPr>
               <a:xfrm>
                 <a:off x="755576" y="1836935"/>
-                <a:ext cx="2489528" cy="559833"/>
+                <a:ext cx="2505879" cy="585288"/>
               </a:xfrm>
               <a:prstGeom prst="rect">
                 <a:avLst/>
@@ -22839,7 +22839,7 @@
               <a:blipFill>
                 <a:blip r:embed="rId2"/>
                 <a:stretch>
-                  <a:fillRect b="-6667"/>
+                  <a:fillRect b="-1042"/>
                 </a:stretch>
               </a:blipFill>
             </p:spPr>
@@ -23972,8 +23972,8 @@
           </p:sp>
         </mc:Fallback>
       </mc:AlternateContent>
-      <mc:AlternateContent xmlns:mc="http://schemas.openxmlformats.org/markup-compatibility/2006" xmlns:a14="http://schemas.microsoft.com/office/drawing/2010/main">
-        <mc:Choice Requires="a14">
+      <mc:AlternateContent xmlns:mc="http://schemas.openxmlformats.org/markup-compatibility/2006">
+        <mc:Choice xmlns:a14="http://schemas.microsoft.com/office/drawing/2010/main" Requires="a14">
           <p:sp>
             <p:nvSpPr>
               <p:cNvPr id="18" name="Rectángulo 17">
@@ -23989,7 +23989,7 @@
             <p:spPr>
               <a:xfrm>
                 <a:off x="5012393" y="1818661"/>
-                <a:ext cx="2502352" cy="578107"/>
+                <a:ext cx="2518703" cy="585288"/>
               </a:xfrm>
               <a:prstGeom prst="rect">
                 <a:avLst/>
@@ -24062,10 +24062,10 @@
                             </m:e>
                             <m:e>
                               <m:r>
-                                <a:rPr lang="es-ES" b="0" i="1" smtClean="0">
-                                  <a:latin typeface="Cambria Math" panose="02040503050406030204" pitchFamily="18" charset="0"/>
-                                </a:rPr>
-                                <m:t>𝑐</m:t>
+                                <a:rPr lang="es-PY" b="0" i="1" smtClean="0">
+                                  <a:latin typeface="Cambria Math" panose="02040503050406030204" pitchFamily="18" charset="0"/>
+                                </a:rPr>
+                                <m:t>𝑑</m:t>
                               </m:r>
                             </m:e>
                           </m:mr>
@@ -24257,7 +24257,7 @@
             </p:txBody>
           </p:sp>
         </mc:Choice>
-        <mc:Fallback xmlns="">
+        <mc:Fallback>
           <p:sp>
             <p:nvSpPr>
               <p:cNvPr id="18" name="Rectángulo 17">
@@ -24275,7 +24275,7 @@
             <p:spPr>
               <a:xfrm>
                 <a:off x="5012393" y="1818661"/>
-                <a:ext cx="2502352" cy="578107"/>
+                <a:ext cx="2518703" cy="585288"/>
               </a:xfrm>
               <a:prstGeom prst="rect">
                 <a:avLst/>
@@ -24283,7 +24283,7 @@
               <a:blipFill>
                 <a:blip r:embed="rId7"/>
                 <a:stretch>
-                  <a:fillRect/>
+                  <a:fillRect b="-1042"/>
                 </a:stretch>
               </a:blipFill>
             </p:spPr>
@@ -24292,7 +24292,7 @@
               <a:lstStyle/>
               <a:p>
                 <a:r>
-                  <a:rPr lang="es-419">
+                  <a:rPr lang="es-PY">
                     <a:noFill/>
                   </a:rPr>
                   <a:t> </a:t>

</xml_diff>